<commit_message>
Changing \\d* to \\d+ in house number example
</commit_message>
<xml_diff>
--- a/powerpoints/sas-r.pptx
+++ b/powerpoints/sas-r.pptx
@@ -244,7 +244,7 @@
           <a:p>
             <a:fld id="{ECC89BB6-A31E-4472-9960-4A29D90DFAEA}" type="datetimeFigureOut">
               <a:rPr lang="en-IE" smtClean="0"/>
-              <a:t>17/05/2022</a:t>
+              <a:t>11/10/2022</a:t>
             </a:fld>
             <a:endParaRPr lang="en-IE"/>
           </a:p>
@@ -414,7 +414,7 @@
           <a:p>
             <a:fld id="{ECC89BB6-A31E-4472-9960-4A29D90DFAEA}" type="datetimeFigureOut">
               <a:rPr lang="en-IE" smtClean="0"/>
-              <a:t>17/05/2022</a:t>
+              <a:t>11/10/2022</a:t>
             </a:fld>
             <a:endParaRPr lang="en-IE"/>
           </a:p>
@@ -594,7 +594,7 @@
           <a:p>
             <a:fld id="{ECC89BB6-A31E-4472-9960-4A29D90DFAEA}" type="datetimeFigureOut">
               <a:rPr lang="en-IE" smtClean="0"/>
-              <a:t>17/05/2022</a:t>
+              <a:t>11/10/2022</a:t>
             </a:fld>
             <a:endParaRPr lang="en-IE"/>
           </a:p>
@@ -764,7 +764,7 @@
           <a:p>
             <a:fld id="{ECC89BB6-A31E-4472-9960-4A29D90DFAEA}" type="datetimeFigureOut">
               <a:rPr lang="en-IE" smtClean="0"/>
-              <a:t>17/05/2022</a:t>
+              <a:t>11/10/2022</a:t>
             </a:fld>
             <a:endParaRPr lang="en-IE"/>
           </a:p>
@@ -1008,7 +1008,7 @@
           <a:p>
             <a:fld id="{ECC89BB6-A31E-4472-9960-4A29D90DFAEA}" type="datetimeFigureOut">
               <a:rPr lang="en-IE" smtClean="0"/>
-              <a:t>17/05/2022</a:t>
+              <a:t>11/10/2022</a:t>
             </a:fld>
             <a:endParaRPr lang="en-IE"/>
           </a:p>
@@ -1240,7 +1240,7 @@
           <a:p>
             <a:fld id="{ECC89BB6-A31E-4472-9960-4A29D90DFAEA}" type="datetimeFigureOut">
               <a:rPr lang="en-IE" smtClean="0"/>
-              <a:t>17/05/2022</a:t>
+              <a:t>11/10/2022</a:t>
             </a:fld>
             <a:endParaRPr lang="en-IE"/>
           </a:p>
@@ -1607,7 +1607,7 @@
           <a:p>
             <a:fld id="{ECC89BB6-A31E-4472-9960-4A29D90DFAEA}" type="datetimeFigureOut">
               <a:rPr lang="en-IE" smtClean="0"/>
-              <a:t>17/05/2022</a:t>
+              <a:t>11/10/2022</a:t>
             </a:fld>
             <a:endParaRPr lang="en-IE"/>
           </a:p>
@@ -1725,7 +1725,7 @@
           <a:p>
             <a:fld id="{ECC89BB6-A31E-4472-9960-4A29D90DFAEA}" type="datetimeFigureOut">
               <a:rPr lang="en-IE" smtClean="0"/>
-              <a:t>17/05/2022</a:t>
+              <a:t>11/10/2022</a:t>
             </a:fld>
             <a:endParaRPr lang="en-IE"/>
           </a:p>
@@ -1820,7 +1820,7 @@
           <a:p>
             <a:fld id="{ECC89BB6-A31E-4472-9960-4A29D90DFAEA}" type="datetimeFigureOut">
               <a:rPr lang="en-IE" smtClean="0"/>
-              <a:t>17/05/2022</a:t>
+              <a:t>11/10/2022</a:t>
             </a:fld>
             <a:endParaRPr lang="en-IE"/>
           </a:p>
@@ -2097,7 +2097,7 @@
           <a:p>
             <a:fld id="{ECC89BB6-A31E-4472-9960-4A29D90DFAEA}" type="datetimeFigureOut">
               <a:rPr lang="en-IE" smtClean="0"/>
-              <a:t>17/05/2022</a:t>
+              <a:t>11/10/2022</a:t>
             </a:fld>
             <a:endParaRPr lang="en-IE"/>
           </a:p>
@@ -2354,7 +2354,7 @@
           <a:p>
             <a:fld id="{ECC89BB6-A31E-4472-9960-4A29D90DFAEA}" type="datetimeFigureOut">
               <a:rPr lang="en-IE" smtClean="0"/>
-              <a:t>17/05/2022</a:t>
+              <a:t>11/10/2022</a:t>
             </a:fld>
             <a:endParaRPr lang="en-IE"/>
           </a:p>
@@ -2567,7 +2567,7 @@
           <a:p>
             <a:fld id="{ECC89BB6-A31E-4472-9960-4A29D90DFAEA}" type="datetimeFigureOut">
               <a:rPr lang="en-IE" smtClean="0"/>
-              <a:t>17/05/2022</a:t>
+              <a:t>11/10/2022</a:t>
             </a:fld>
             <a:endParaRPr lang="en-IE"/>
           </a:p>
@@ -14674,7 +14674,7 @@
           <a:p>
             <a:pPr algn="r"/>
             <a:r>
-              <a:rPr lang="en-IE" sz="1128">
+              <a:rPr lang="en-IE" sz="1128" dirty="0">
                 <a:solidFill>
                   <a:schemeClr val="accent4"/>
                 </a:solidFill>
@@ -14683,18 +14683,13 @@
               <a:t>CC BY SA</a:t>
             </a:r>
             <a:r>
-              <a:rPr lang="en-IE" sz="1128">
+              <a:rPr lang="en-IE" sz="1128" dirty="0">
                 <a:solidFill>
                   <a:schemeClr val="accent4"/>
                 </a:solidFill>
               </a:rPr>
-              <a:t> Brendan O’Dowd • brendanjodowd@gmail.com • Updated 2022-05</a:t>
+              <a:t> Brendan O’Dowd • brendanjodowd@gmail.com • Updated 2022-10</a:t>
             </a:r>
-            <a:endParaRPr lang="en-IE" sz="1128" dirty="0">
-              <a:solidFill>
-                <a:schemeClr val="accent4"/>
-              </a:solidFill>
-            </a:endParaRPr>
           </a:p>
         </p:txBody>
       </p:sp>
@@ -14728,6 +14723,58 @@
           <a:chExt cx="0" cy="0"/>
         </a:xfrm>
       </p:grpSpPr>
+      <p:sp>
+        <p:nvSpPr>
+          <p:cNvPr id="2" name="Rectangle 1">
+            <a:extLst>
+              <a:ext uri="{FF2B5EF4-FFF2-40B4-BE49-F238E27FC236}">
+                <a16:creationId xmlns:a16="http://schemas.microsoft.com/office/drawing/2014/main" id="{525A5071-2A05-2A07-2BA6-7A3EBE33446C}"/>
+              </a:ext>
+            </a:extLst>
+          </p:cNvPr>
+          <p:cNvSpPr/>
+          <p:nvPr/>
+        </p:nvSpPr>
+        <p:spPr>
+          <a:xfrm>
+            <a:off x="0" y="0"/>
+            <a:ext cx="13970000" cy="10795000"/>
+          </a:xfrm>
+          <a:prstGeom prst="rect">
+            <a:avLst/>
+          </a:prstGeom>
+          <a:solidFill>
+            <a:schemeClr val="bg1"/>
+          </a:solidFill>
+          <a:ln>
+            <a:noFill/>
+          </a:ln>
+        </p:spPr>
+        <p:style>
+          <a:lnRef idx="2">
+            <a:schemeClr val="accent1">
+              <a:shade val="50000"/>
+            </a:schemeClr>
+          </a:lnRef>
+          <a:fillRef idx="1">
+            <a:schemeClr val="accent1"/>
+          </a:fillRef>
+          <a:effectRef idx="0">
+            <a:schemeClr val="accent1"/>
+          </a:effectRef>
+          <a:fontRef idx="minor">
+            <a:schemeClr val="lt1"/>
+          </a:fontRef>
+        </p:style>
+        <p:txBody>
+          <a:bodyPr rtlCol="0" anchor="ctr"/>
+          <a:lstStyle/>
+          <a:p>
+            <a:pPr algn="ctr"/>
+            <a:endParaRPr lang="en-IE"/>
+          </a:p>
+        </p:txBody>
+      </p:sp>
       <p:cxnSp>
         <p:nvCxnSpPr>
           <p:cNvPr id="4" name="Straight Connector 3">
@@ -19311,7 +19358,7 @@
           <p:nvPr>
             <p:extLst>
               <p:ext uri="{D42A27DB-BD31-4B8C-83A1-F6EECF244321}">
-                <p14:modId xmlns:p14="http://schemas.microsoft.com/office/powerpoint/2010/main" val="650584371"/>
+                <p14:modId xmlns:p14="http://schemas.microsoft.com/office/powerpoint/2010/main" val="4236710952"/>
               </p:ext>
             </p:extLst>
           </p:nvPr>
@@ -22809,7 +22856,7 @@
                         <a:defRPr/>
                       </a:pPr>
                       <a:r>
-                        <a:rPr lang="en-IE" sz="1000" b="0" err="1">
+                        <a:rPr lang="en-IE" sz="1000" b="0" dirty="0" err="1">
                           <a:solidFill>
                             <a:schemeClr val="accent4"/>
                           </a:solidFill>
@@ -22819,7 +22866,7 @@
                         <a:t>new_data</a:t>
                       </a:r>
                       <a:r>
-                        <a:rPr lang="en-IE" sz="1000" b="0">
+                        <a:rPr lang="en-IE" sz="1000" b="0" dirty="0">
                           <a:solidFill>
                             <a:schemeClr val="accent4"/>
                           </a:solidFill>
@@ -22829,7 +22876,7 @@
                         <a:t> </a:t>
                       </a:r>
                       <a:r>
-                        <a:rPr lang="en-IE" sz="1000" b="1">
+                        <a:rPr lang="en-IE" sz="1000" b="1" dirty="0">
                           <a:solidFill>
                             <a:schemeClr val="accent4"/>
                           </a:solidFill>
@@ -22839,7 +22886,7 @@
                         <a:t>&lt;-</a:t>
                       </a:r>
                       <a:r>
-                        <a:rPr lang="en-IE" sz="1000" b="0">
+                        <a:rPr lang="en-IE" sz="1000" b="0" dirty="0">
                           <a:solidFill>
                             <a:schemeClr val="accent4"/>
                           </a:solidFill>
@@ -22849,7 +22896,7 @@
                         <a:t> </a:t>
                       </a:r>
                       <a:r>
-                        <a:rPr lang="en-IE" sz="1000" b="0" err="1">
+                        <a:rPr lang="en-IE" sz="1000" b="0" dirty="0" err="1">
                           <a:solidFill>
                             <a:schemeClr val="accent4"/>
                           </a:solidFill>
@@ -22859,7 +22906,7 @@
                         <a:t>old_data</a:t>
                       </a:r>
                       <a:r>
-                        <a:rPr lang="en-IE" sz="1000" b="0">
+                        <a:rPr lang="en-IE" sz="1000" b="0" dirty="0">
                           <a:solidFill>
                             <a:schemeClr val="accent4"/>
                           </a:solidFill>
@@ -22871,7 +22918,7 @@
                     </a:p>
                     <a:p>
                       <a:r>
-                        <a:rPr lang="en-IE" sz="1000" b="0">
+                        <a:rPr lang="en-IE" sz="1000" b="0" dirty="0">
                           <a:solidFill>
                             <a:schemeClr val="accent4"/>
                           </a:solidFill>
@@ -22881,7 +22928,7 @@
                         <a:t>  mutate( </a:t>
                       </a:r>
                       <a:r>
-                        <a:rPr lang="en-IE" sz="1000" b="0" err="1">
+                        <a:rPr lang="en-IE" sz="1000" b="0" dirty="0" err="1">
                           <a:solidFill>
                             <a:schemeClr val="accent2"/>
                           </a:solidFill>
@@ -22891,7 +22938,7 @@
                         <a:t>house_number</a:t>
                       </a:r>
                       <a:r>
-                        <a:rPr lang="en-IE" sz="1000" b="0">
+                        <a:rPr lang="en-IE" sz="1000" b="0" dirty="0">
                           <a:solidFill>
                             <a:schemeClr val="accent2"/>
                           </a:solidFill>
@@ -22901,7 +22948,7 @@
                         <a:t> </a:t>
                       </a:r>
                       <a:r>
-                        <a:rPr lang="en-IE" sz="1000" b="1">
+                        <a:rPr lang="en-IE" sz="1000" b="1" dirty="0">
                           <a:solidFill>
                             <a:schemeClr val="accent1"/>
                           </a:solidFill>
@@ -22911,7 +22958,7 @@
                         <a:t>= </a:t>
                       </a:r>
                       <a:r>
-                        <a:rPr lang="en-IE" sz="1000" b="1" err="1">
+                        <a:rPr lang="en-IE" sz="1000" b="1" dirty="0" err="1">
                           <a:solidFill>
                             <a:schemeClr val="accent1"/>
                           </a:solidFill>
@@ -22921,7 +22968,7 @@
                         <a:t>str_extract</a:t>
                       </a:r>
                       <a:r>
-                        <a:rPr lang="en-IE" sz="1000" b="1">
+                        <a:rPr lang="en-IE" sz="1000" b="1" dirty="0">
                           <a:solidFill>
                             <a:schemeClr val="accent1"/>
                           </a:solidFill>
@@ -22931,7 +22978,7 @@
                         <a:t>( </a:t>
                       </a:r>
                       <a:r>
-                        <a:rPr lang="en-IE" sz="1000" b="0">
+                        <a:rPr lang="en-IE" sz="1000" b="0" dirty="0">
                           <a:solidFill>
                             <a:schemeClr val="accent2"/>
                           </a:solidFill>
@@ -22941,7 +22988,7 @@
                         <a:t>address</a:t>
                       </a:r>
                       <a:r>
-                        <a:rPr lang="en-IE" sz="1000" b="1">
+                        <a:rPr lang="en-IE" sz="1000" b="1" dirty="0">
                           <a:solidFill>
                             <a:schemeClr val="accent1"/>
                           </a:solidFill>
@@ -22951,7 +22998,7 @@
                         <a:t> , </a:t>
                       </a:r>
                       <a:r>
-                        <a:rPr lang="en-US" sz="1000" b="1">
+                        <a:rPr lang="en-US" sz="1000" b="1" dirty="0">
                           <a:solidFill>
                             <a:schemeClr val="accent1"/>
                           </a:solidFill>
@@ -22961,17 +23008,17 @@
                         <a:t>"</a:t>
                       </a:r>
                       <a:r>
-                        <a:rPr lang="en-IE" sz="1000" b="0">
-                          <a:solidFill>
-                            <a:schemeClr val="accent1"/>
-                          </a:solidFill>
-                          <a:latin typeface="Segoe UI" panose="020B0502040204020203" pitchFamily="34" charset="0"/>
-                          <a:cs typeface="Segoe UI" panose="020B0502040204020203" pitchFamily="34" charset="0"/>
-                        </a:rPr>
-                        <a:t>\\d*</a:t>
-                      </a:r>
-                      <a:r>
-                        <a:rPr lang="en-US" sz="1000" b="1">
+                        <a:rPr lang="en-IE" sz="1000" b="0" dirty="0">
+                          <a:solidFill>
+                            <a:schemeClr val="accent1"/>
+                          </a:solidFill>
+                          <a:latin typeface="Segoe UI" panose="020B0502040204020203" pitchFamily="34" charset="0"/>
+                          <a:cs typeface="Segoe UI" panose="020B0502040204020203" pitchFamily="34" charset="0"/>
+                        </a:rPr>
+                        <a:t>\\d+</a:t>
+                      </a:r>
+                      <a:r>
+                        <a:rPr lang="en-US" sz="1000" b="1" dirty="0">
                           <a:solidFill>
                             <a:schemeClr val="accent1"/>
                           </a:solidFill>
@@ -22981,7 +23028,7 @@
                         <a:t>"</a:t>
                       </a:r>
                       <a:r>
-                        <a:rPr lang="en-IE" sz="1000" b="1">
+                        <a:rPr lang="en-IE" sz="1000" b="1" dirty="0">
                           <a:solidFill>
                             <a:schemeClr val="accent1"/>
                           </a:solidFill>
@@ -22991,7 +23038,7 @@
                         <a:t> )</a:t>
                       </a:r>
                       <a:r>
-                        <a:rPr lang="en-IE" sz="1000" b="0">
+                        <a:rPr lang="en-IE" sz="1000" b="0" dirty="0">
                           <a:solidFill>
                             <a:schemeClr val="accent4"/>
                           </a:solidFill>
@@ -25190,7 +25237,7 @@
                     <a:lstStyle/>
                     <a:p>
                       <a:r>
-                        <a:rPr lang="en-IE" sz="1000" b="0" err="1">
+                        <a:rPr lang="en-IE" sz="1000" b="0" dirty="0" err="1">
                           <a:solidFill>
                             <a:schemeClr val="accent2"/>
                           </a:solidFill>
@@ -25200,7 +25247,7 @@
                         <a:t>my_data</a:t>
                       </a:r>
                       <a:r>
-                        <a:rPr lang="en-IE" sz="1000" b="0">
+                        <a:rPr lang="en-IE" sz="1000" b="0" dirty="0">
                           <a:solidFill>
                             <a:schemeClr val="accent2"/>
                           </a:solidFill>
@@ -25210,7 +25257,7 @@
                         <a:t> </a:t>
                       </a:r>
                       <a:r>
-                        <a:rPr lang="en-IE" sz="1000" b="1">
+                        <a:rPr lang="en-IE" sz="1000" b="1" dirty="0">
                           <a:solidFill>
                             <a:schemeClr val="accent1"/>
                           </a:solidFill>
@@ -25220,7 +25267,7 @@
                         <a:t>&lt;- </a:t>
                       </a:r>
                       <a:r>
-                        <a:rPr lang="en-IE" sz="1000" b="1" err="1">
+                        <a:rPr lang="en-IE" sz="1000" b="1" dirty="0" err="1">
                           <a:solidFill>
                             <a:schemeClr val="accent1"/>
                           </a:solidFill>
@@ -25230,7 +25277,7 @@
                         <a:t>read_csv</a:t>
                       </a:r>
                       <a:r>
-                        <a:rPr lang="en-IE" sz="1000" b="1">
+                        <a:rPr lang="en-IE" sz="1000" b="1" dirty="0">
                           <a:solidFill>
                             <a:schemeClr val="accent1"/>
                           </a:solidFill>
@@ -25240,7 +25287,7 @@
                         <a:t>(</a:t>
                       </a:r>
                       <a:r>
-                        <a:rPr lang="en-US" sz="1000" b="1">
+                        <a:rPr lang="en-US" sz="1000" b="1" dirty="0">
                           <a:solidFill>
                             <a:schemeClr val="accent1"/>
                           </a:solidFill>
@@ -25250,7 +25297,7 @@
                         <a:t>"</a:t>
                       </a:r>
                       <a:r>
-                        <a:rPr lang="en-IE" sz="1000" b="0">
+                        <a:rPr lang="en-IE" sz="1000" b="0" dirty="0">
                           <a:solidFill>
                             <a:schemeClr val="accent2"/>
                           </a:solidFill>
@@ -25260,7 +25307,7 @@
                         <a:t>my_file.csv</a:t>
                       </a:r>
                       <a:r>
-                        <a:rPr lang="en-US" sz="1000" b="1">
+                        <a:rPr lang="en-US" sz="1000" b="1" dirty="0">
                           <a:solidFill>
                             <a:schemeClr val="accent1"/>
                           </a:solidFill>
@@ -25270,7 +25317,7 @@
                         <a:t>"</a:t>
                       </a:r>
                       <a:r>
-                        <a:rPr lang="en-IE" sz="1000" b="1">
+                        <a:rPr lang="en-IE" sz="1000" b="1" dirty="0">
                           <a:solidFill>
                             <a:schemeClr val="accent1"/>
                           </a:solidFill>
@@ -26234,7 +26281,7 @@
           <a:p>
             <a:pPr algn="r"/>
             <a:r>
-              <a:rPr lang="en-IE" sz="1128">
+              <a:rPr lang="en-IE" sz="1128" dirty="0">
                 <a:solidFill>
                   <a:schemeClr val="accent4"/>
                 </a:solidFill>
@@ -26243,18 +26290,13 @@
               <a:t>CC BY SA</a:t>
             </a:r>
             <a:r>
-              <a:rPr lang="en-IE" sz="1128">
+              <a:rPr lang="en-IE" sz="1128" dirty="0">
                 <a:solidFill>
                   <a:schemeClr val="accent4"/>
                 </a:solidFill>
               </a:rPr>
-              <a:t> Brendan O’Dowd • brendanjodowd@gmail.com • Updated 2022-05</a:t>
+              <a:t> Brendan O’Dowd • brendanjodowd@gmail.com • Updated 2022-10</a:t>
             </a:r>
-            <a:endParaRPr lang="en-IE" sz="1128" dirty="0">
-              <a:solidFill>
-                <a:schemeClr val="accent4"/>
-              </a:solidFill>
-            </a:endParaRPr>
           </a:p>
         </p:txBody>
       </p:sp>

</xml_diff>